<commit_message>
Update the paper start the metrics
</commit_message>
<xml_diff>
--- a/tex/paper/architecture.pptx
+++ b/tex/paper/architecture.pptx
@@ -6,8 +6,7 @@
   </p:sldMasterIdLst>
   <p:sldIdLst>
     <p:sldId id="256" r:id="rId2"/>
-    <p:sldId id="258" r:id="rId3"/>
-    <p:sldId id="257" r:id="rId4"/>
+    <p:sldId id="257" r:id="rId3"/>
   </p:sldIdLst>
   <p:sldSz cx="12192000" cy="6858000"/>
   <p:notesSz cx="6858000" cy="9144000"/>
@@ -245,7 +244,7 @@
           <a:p>
             <a:fld id="{69ADDDA9-05E7-A749-80EC-2D38279526D1}" type="datetimeFigureOut">
               <a:rPr lang="en-US" smtClean="0"/>
-              <a:t>8/27/17</a:t>
+              <a:t>9/3/17</a:t>
             </a:fld>
             <a:endParaRPr lang="en-US"/>
           </a:p>
@@ -415,7 +414,7 @@
           <a:p>
             <a:fld id="{69ADDDA9-05E7-A749-80EC-2D38279526D1}" type="datetimeFigureOut">
               <a:rPr lang="en-US" smtClean="0"/>
-              <a:t>8/27/17</a:t>
+              <a:t>9/3/17</a:t>
             </a:fld>
             <a:endParaRPr lang="en-US"/>
           </a:p>
@@ -595,7 +594,7 @@
           <a:p>
             <a:fld id="{69ADDDA9-05E7-A749-80EC-2D38279526D1}" type="datetimeFigureOut">
               <a:rPr lang="en-US" smtClean="0"/>
-              <a:t>8/27/17</a:t>
+              <a:t>9/3/17</a:t>
             </a:fld>
             <a:endParaRPr lang="en-US"/>
           </a:p>
@@ -765,7 +764,7 @@
           <a:p>
             <a:fld id="{69ADDDA9-05E7-A749-80EC-2D38279526D1}" type="datetimeFigureOut">
               <a:rPr lang="en-US" smtClean="0"/>
-              <a:t>8/27/17</a:t>
+              <a:t>9/3/17</a:t>
             </a:fld>
             <a:endParaRPr lang="en-US"/>
           </a:p>
@@ -1011,7 +1010,7 @@
           <a:p>
             <a:fld id="{69ADDDA9-05E7-A749-80EC-2D38279526D1}" type="datetimeFigureOut">
               <a:rPr lang="en-US" smtClean="0"/>
-              <a:t>8/27/17</a:t>
+              <a:t>9/3/17</a:t>
             </a:fld>
             <a:endParaRPr lang="en-US"/>
           </a:p>
@@ -1243,7 +1242,7 @@
           <a:p>
             <a:fld id="{69ADDDA9-05E7-A749-80EC-2D38279526D1}" type="datetimeFigureOut">
               <a:rPr lang="en-US" smtClean="0"/>
-              <a:t>8/27/17</a:t>
+              <a:t>9/3/17</a:t>
             </a:fld>
             <a:endParaRPr lang="en-US"/>
           </a:p>
@@ -1610,7 +1609,7 @@
           <a:p>
             <a:fld id="{69ADDDA9-05E7-A749-80EC-2D38279526D1}" type="datetimeFigureOut">
               <a:rPr lang="en-US" smtClean="0"/>
-              <a:t>8/27/17</a:t>
+              <a:t>9/3/17</a:t>
             </a:fld>
             <a:endParaRPr lang="en-US"/>
           </a:p>
@@ -1728,7 +1727,7 @@
           <a:p>
             <a:fld id="{69ADDDA9-05E7-A749-80EC-2D38279526D1}" type="datetimeFigureOut">
               <a:rPr lang="en-US" smtClean="0"/>
-              <a:t>8/27/17</a:t>
+              <a:t>9/3/17</a:t>
             </a:fld>
             <a:endParaRPr lang="en-US"/>
           </a:p>
@@ -1823,7 +1822,7 @@
           <a:p>
             <a:fld id="{69ADDDA9-05E7-A749-80EC-2D38279526D1}" type="datetimeFigureOut">
               <a:rPr lang="en-US" smtClean="0"/>
-              <a:t>8/27/17</a:t>
+              <a:t>9/3/17</a:t>
             </a:fld>
             <a:endParaRPr lang="en-US"/>
           </a:p>
@@ -2100,7 +2099,7 @@
           <a:p>
             <a:fld id="{69ADDDA9-05E7-A749-80EC-2D38279526D1}" type="datetimeFigureOut">
               <a:rPr lang="en-US" smtClean="0"/>
-              <a:t>8/27/17</a:t>
+              <a:t>9/3/17</a:t>
             </a:fld>
             <a:endParaRPr lang="en-US"/>
           </a:p>
@@ -2353,7 +2352,7 @@
           <a:p>
             <a:fld id="{69ADDDA9-05E7-A749-80EC-2D38279526D1}" type="datetimeFigureOut">
               <a:rPr lang="en-US" smtClean="0"/>
-              <a:t>8/27/17</a:t>
+              <a:t>9/3/17</a:t>
             </a:fld>
             <a:endParaRPr lang="en-US"/>
           </a:p>
@@ -2566,7 +2565,7 @@
           <a:p>
             <a:fld id="{69ADDDA9-05E7-A749-80EC-2D38279526D1}" type="datetimeFigureOut">
               <a:rPr lang="en-US" smtClean="0"/>
-              <a:t>8/27/17</a:t>
+              <a:t>9/3/17</a:t>
             </a:fld>
             <a:endParaRPr lang="en-US"/>
           </a:p>
@@ -3185,7 +3184,7 @@
             <a:pPr algn="ctr"/>
             <a:r>
               <a:rPr lang="en-US" sz="2400" dirty="0" smtClean="0"/>
-              <a:t>Engine</a:t>
+              <a:t>Weighted Engine</a:t>
             </a:r>
             <a:endParaRPr lang="en-US" sz="2400" dirty="0"/>
           </a:p>
@@ -3227,7 +3226,7 @@
             <a:pPr algn="ctr"/>
             <a:r>
               <a:rPr lang="en-US" sz="2400" dirty="0" smtClean="0"/>
-              <a:t>Random</a:t>
+              <a:t>Uniform Engine</a:t>
             </a:r>
             <a:endParaRPr lang="en-US" sz="2400" dirty="0"/>
           </a:p>
@@ -3263,303 +3262,9 @@
           <a:chExt cx="0" cy="0"/>
         </a:xfrm>
       </p:grpSpPr>
-      <p:sp>
-        <p:nvSpPr>
-          <p:cNvPr id="5" name="Rounded Rectangle 4"/>
-          <p:cNvSpPr/>
-          <p:nvPr/>
-        </p:nvSpPr>
-        <p:spPr>
-          <a:xfrm>
-            <a:off x="2408662" y="3653885"/>
-            <a:ext cx="7248293" cy="981307"/>
-          </a:xfrm>
-          <a:prstGeom prst="roundRect">
-            <a:avLst/>
-          </a:prstGeom>
-        </p:spPr>
-        <p:style>
-          <a:lnRef idx="2">
-            <a:schemeClr val="accent5">
-              <a:shade val="50000"/>
-            </a:schemeClr>
-          </a:lnRef>
-          <a:fillRef idx="1">
-            <a:schemeClr val="accent5"/>
-          </a:fillRef>
-          <a:effectRef idx="0">
-            <a:schemeClr val="accent5"/>
-          </a:effectRef>
-          <a:fontRef idx="minor">
-            <a:schemeClr val="lt1"/>
-          </a:fontRef>
-        </p:style>
-        <p:txBody>
-          <a:bodyPr rtlCol="0" anchor="ctr"/>
-          <a:lstStyle/>
-          <a:p>
-            <a:pPr algn="ctr"/>
-            <a:r>
-              <a:rPr lang="en-US" sz="2400" dirty="0" smtClean="0"/>
-              <a:t>Database</a:t>
-            </a:r>
-            <a:endParaRPr lang="en-US" sz="2400" dirty="0"/>
-          </a:p>
-        </p:txBody>
-      </p:sp>
-      <p:sp>
-        <p:nvSpPr>
-          <p:cNvPr id="10" name="Rectangle 9"/>
-          <p:cNvSpPr/>
-          <p:nvPr/>
-        </p:nvSpPr>
-        <p:spPr>
-          <a:xfrm>
-            <a:off x="9738360" y="1576038"/>
-            <a:ext cx="929640" cy="3059154"/>
-          </a:xfrm>
-          <a:prstGeom prst="rect">
-            <a:avLst/>
-          </a:prstGeom>
-          <a:solidFill>
-            <a:schemeClr val="accent1">
-              <a:lumMod val="50000"/>
-            </a:schemeClr>
-          </a:solidFill>
-        </p:spPr>
-        <p:style>
-          <a:lnRef idx="2">
-            <a:schemeClr val="accent1">
-              <a:shade val="50000"/>
-            </a:schemeClr>
-          </a:lnRef>
-          <a:fillRef idx="1">
-            <a:schemeClr val="accent1"/>
-          </a:fillRef>
-          <a:effectRef idx="0">
-            <a:schemeClr val="accent1"/>
-          </a:effectRef>
-          <a:fontRef idx="minor">
-            <a:schemeClr val="lt1"/>
-          </a:fontRef>
-        </p:style>
-        <p:txBody>
-          <a:bodyPr rtlCol="0" anchor="ctr"/>
-          <a:lstStyle/>
-          <a:p>
-            <a:pPr algn="ctr"/>
-            <a:r>
-              <a:rPr lang="en-US" dirty="0" smtClean="0"/>
-              <a:t>Testing</a:t>
-            </a:r>
-            <a:endParaRPr lang="en-US" dirty="0"/>
-          </a:p>
-        </p:txBody>
-      </p:sp>
-      <p:sp>
-        <p:nvSpPr>
-          <p:cNvPr id="11" name="Rounded Rectangle 10"/>
-          <p:cNvSpPr/>
-          <p:nvPr/>
-        </p:nvSpPr>
-        <p:spPr>
-          <a:xfrm>
-            <a:off x="2408663" y="2217421"/>
-            <a:ext cx="7248293" cy="1384424"/>
-          </a:xfrm>
-          <a:prstGeom prst="roundRect">
-            <a:avLst/>
-          </a:prstGeom>
-        </p:spPr>
-        <p:style>
-          <a:lnRef idx="2">
-            <a:schemeClr val="accent5">
-              <a:shade val="50000"/>
-            </a:schemeClr>
-          </a:lnRef>
-          <a:fillRef idx="1">
-            <a:schemeClr val="accent5"/>
-          </a:fillRef>
-          <a:effectRef idx="0">
-            <a:schemeClr val="accent5"/>
-          </a:effectRef>
-          <a:fontRef idx="minor">
-            <a:schemeClr val="lt1"/>
-          </a:fontRef>
-        </p:style>
-        <p:txBody>
-          <a:bodyPr rtlCol="0" anchor="t"/>
-          <a:lstStyle/>
-          <a:p>
-            <a:r>
-              <a:rPr lang="en-US" sz="2400" dirty="0" smtClean="0"/>
-              <a:t>Core</a:t>
-            </a:r>
-            <a:endParaRPr lang="en-US" sz="2400" dirty="0"/>
-          </a:p>
-        </p:txBody>
-      </p:sp>
-      <p:sp>
-        <p:nvSpPr>
-          <p:cNvPr id="12" name="Rounded Rectangle 11"/>
-          <p:cNvSpPr/>
-          <p:nvPr/>
-        </p:nvSpPr>
-        <p:spPr>
-          <a:xfrm>
-            <a:off x="2408663" y="1576038"/>
-            <a:ext cx="7248293" cy="589343"/>
-          </a:xfrm>
-          <a:prstGeom prst="roundRect">
-            <a:avLst/>
-          </a:prstGeom>
-        </p:spPr>
-        <p:style>
-          <a:lnRef idx="2">
-            <a:schemeClr val="accent5">
-              <a:shade val="50000"/>
-            </a:schemeClr>
-          </a:lnRef>
-          <a:fillRef idx="1">
-            <a:schemeClr val="accent5"/>
-          </a:fillRef>
-          <a:effectRef idx="0">
-            <a:schemeClr val="accent5"/>
-          </a:effectRef>
-          <a:fontRef idx="minor">
-            <a:schemeClr val="lt1"/>
-          </a:fontRef>
-        </p:style>
-        <p:txBody>
-          <a:bodyPr rtlCol="0" anchor="ctr"/>
-          <a:lstStyle/>
-          <a:p>
-            <a:pPr algn="ctr"/>
-            <a:r>
-              <a:rPr lang="en-US" sz="2400" dirty="0" smtClean="0"/>
-              <a:t>CLI</a:t>
-            </a:r>
-            <a:endParaRPr lang="en-US" sz="2400" dirty="0"/>
-          </a:p>
-        </p:txBody>
-      </p:sp>
-      <p:sp>
-        <p:nvSpPr>
-          <p:cNvPr id="13" name="Rounded Rectangle 12"/>
-          <p:cNvSpPr/>
-          <p:nvPr/>
-        </p:nvSpPr>
-        <p:spPr>
-          <a:xfrm>
-            <a:off x="3910734" y="2429573"/>
-            <a:ext cx="5508330" cy="480060"/>
-          </a:xfrm>
-          <a:prstGeom prst="roundRect">
-            <a:avLst/>
-          </a:prstGeom>
-        </p:spPr>
-        <p:style>
-          <a:lnRef idx="3">
-            <a:schemeClr val="lt1"/>
-          </a:lnRef>
-          <a:fillRef idx="1">
-            <a:schemeClr val="accent1"/>
-          </a:fillRef>
-          <a:effectRef idx="1">
-            <a:schemeClr val="accent1"/>
-          </a:effectRef>
-          <a:fontRef idx="minor">
-            <a:schemeClr val="lt1"/>
-          </a:fontRef>
-        </p:style>
-        <p:txBody>
-          <a:bodyPr rtlCol="0" anchor="t"/>
-          <a:lstStyle/>
-          <a:p>
-            <a:pPr algn="ctr"/>
-            <a:r>
-              <a:rPr lang="en-US" sz="2400" smtClean="0"/>
-              <a:t>Query</a:t>
-            </a:r>
-            <a:endParaRPr lang="en-US" sz="2400" dirty="0"/>
-          </a:p>
-        </p:txBody>
-      </p:sp>
-      <p:sp>
-        <p:nvSpPr>
-          <p:cNvPr id="14" name="Rounded Rectangle 13"/>
-          <p:cNvSpPr/>
-          <p:nvPr/>
-        </p:nvSpPr>
-        <p:spPr>
-          <a:xfrm>
-            <a:off x="3910734" y="2994660"/>
-            <a:ext cx="5508330" cy="473369"/>
-          </a:xfrm>
-          <a:prstGeom prst="roundRect">
-            <a:avLst/>
-          </a:prstGeom>
-        </p:spPr>
-        <p:style>
-          <a:lnRef idx="3">
-            <a:schemeClr val="lt1"/>
-          </a:lnRef>
-          <a:fillRef idx="1">
-            <a:schemeClr val="accent1"/>
-          </a:fillRef>
-          <a:effectRef idx="1">
-            <a:schemeClr val="accent1"/>
-          </a:effectRef>
-          <a:fontRef idx="minor">
-            <a:schemeClr val="lt1"/>
-          </a:fontRef>
-        </p:style>
-        <p:txBody>
-          <a:bodyPr rtlCol="0" anchor="t"/>
-          <a:lstStyle/>
-          <a:p>
-            <a:pPr algn="ctr"/>
-            <a:r>
-              <a:rPr lang="en-US" sz="2400" dirty="0" smtClean="0"/>
-              <a:t>DB Connection</a:t>
-            </a:r>
-            <a:endParaRPr lang="en-US" sz="2400" dirty="0"/>
-          </a:p>
-        </p:txBody>
-      </p:sp>
-    </p:spTree>
-    <p:extLst>
-      <p:ext uri="{BB962C8B-B14F-4D97-AF65-F5344CB8AC3E}">
-        <p14:creationId xmlns:p14="http://schemas.microsoft.com/office/powerpoint/2010/main" val="298218243"/>
-      </p:ext>
-    </p:extLst>
-  </p:cSld>
-  <p:clrMapOvr>
-    <a:masterClrMapping/>
-  </p:clrMapOvr>
-</p:sld>
-</file>
-
-<file path=ppt/slides/slide3.xml><?xml version="1.0" encoding="utf-8"?>
-<p:sld xmlns:a="http://schemas.openxmlformats.org/drawingml/2006/main" xmlns:r="http://schemas.openxmlformats.org/officeDocument/2006/relationships" xmlns:p="http://schemas.openxmlformats.org/presentationml/2006/main">
-  <p:cSld>
-    <p:spTree>
-      <p:nvGrpSpPr>
-        <p:cNvPr id="1" name=""/>
-        <p:cNvGrpSpPr/>
-        <p:nvPr/>
-      </p:nvGrpSpPr>
-      <p:grpSpPr>
-        <a:xfrm>
-          <a:off x="0" y="0"/>
-          <a:ext cx="0" cy="0"/>
-          <a:chOff x="0" y="0"/>
-          <a:chExt cx="0" cy="0"/>
-        </a:xfrm>
-      </p:grpSpPr>
       <p:pic>
         <p:nvPicPr>
-          <p:cNvPr id="30" name="Picture 29"/>
+          <p:cNvPr id="3" name="Picture 2"/>
           <p:cNvPicPr>
             <a:picLocks noChangeAspect="1"/>
           </p:cNvPicPr>
@@ -3573,8 +3278,8 @@
         </p:blipFill>
         <p:spPr>
           <a:xfrm>
-            <a:off x="2240280" y="3263900"/>
-            <a:ext cx="8305800" cy="3073400"/>
+            <a:off x="1943100" y="2406650"/>
+            <a:ext cx="8305800" cy="2044700"/>
           </a:xfrm>
           <a:prstGeom prst="rect">
             <a:avLst/>
@@ -3583,21 +3288,21 @@
       </p:pic>
       <p:pic>
         <p:nvPicPr>
-          <p:cNvPr id="2" name="Picture 1"/>
+          <p:cNvPr id="17" name="Picture 16"/>
           <p:cNvPicPr>
             <a:picLocks noChangeAspect="1"/>
           </p:cNvPicPr>
           <p:nvPr/>
         </p:nvPicPr>
         <p:blipFill>
-          <a:blip r:embed="rId3"/>
+          <a:blip r:embed="rId2"/>
           <a:stretch>
             <a:fillRect/>
           </a:stretch>
         </p:blipFill>
         <p:spPr>
           <a:xfrm>
-            <a:off x="2240280" y="1057910"/>
+            <a:off x="1920240" y="2440940"/>
             <a:ext cx="8305800" cy="2044700"/>
           </a:xfrm>
           <a:prstGeom prst="rect">

</xml_diff>